<commit_message>
updated week 6 lecture sldes
</commit_message>
<xml_diff>
--- a/Week_6/cursor_lecture.pptx
+++ b/Week_6/cursor_lecture.pptx
@@ -6,6 +6,13 @@
   </p:sldMasterIdLst>
   <p:sldIdLst>
     <p:sldId id="256" r:id="rId2"/>
+    <p:sldId id="257" r:id="rId3"/>
+    <p:sldId id="258" r:id="rId4"/>
+    <p:sldId id="259" r:id="rId5"/>
+    <p:sldId id="260" r:id="rId6"/>
+    <p:sldId id="262" r:id="rId7"/>
+    <p:sldId id="261" r:id="rId8"/>
+    <p:sldId id="263" r:id="rId9"/>
   </p:sldIdLst>
   <p:sldSz cx="12192000" cy="6858000"/>
   <p:notesSz cx="6858000" cy="9144000"/>
@@ -104,6 +111,11 @@
       </a:defRPr>
     </a:lvl9pPr>
   </p:defaultTextStyle>
+  <p:extLst>
+    <p:ext uri="{EFAFB233-063F-42B5-8137-9DF3F51BA10A}">
+      <p15:sldGuideLst xmlns:p15="http://schemas.microsoft.com/office/powerpoint/2012/main"/>
+    </p:ext>
+  </p:extLst>
 </p:presentation>
 </file>
 
@@ -152,7 +164,6 @@
               <a:rPr lang="en-US"/>
               <a:t>Click to edit Master title style</a:t>
             </a:r>
-            <a:endParaRPr lang="en-US"/>
           </a:p>
         </p:txBody>
       </p:sp>
@@ -217,7 +228,6 @@
               <a:rPr lang="en-US"/>
               <a:t>Click to edit Master subtitle style</a:t>
             </a:r>
-            <a:endParaRPr lang="en-US"/>
           </a:p>
         </p:txBody>
       </p:sp>
@@ -238,7 +248,7 @@
           <a:p>
             <a:fld id="{828A52BA-EE88-42EE-9D24-82249EAB6ED1}" type="datetimeFigureOut">
               <a:rPr lang="en-US" smtClean="0"/>
-              <a:t>2/17/2017</a:t>
+              <a:t>2/18/2017</a:t>
             </a:fld>
             <a:endParaRPr lang="en-US"/>
           </a:p>
@@ -335,7 +345,6 @@
               <a:rPr lang="en-US"/>
               <a:t>Click to edit Master title style</a:t>
             </a:r>
-            <a:endParaRPr lang="en-US"/>
           </a:p>
         </p:txBody>
       </p:sp>
@@ -387,7 +396,6 @@
               <a:rPr lang="en-US"/>
               <a:t>Fifth level</a:t>
             </a:r>
-            <a:endParaRPr lang="en-US"/>
           </a:p>
         </p:txBody>
       </p:sp>
@@ -408,7 +416,7 @@
           <a:p>
             <a:fld id="{828A52BA-EE88-42EE-9D24-82249EAB6ED1}" type="datetimeFigureOut">
               <a:rPr lang="en-US" smtClean="0"/>
-              <a:t>2/17/2017</a:t>
+              <a:t>2/18/2017</a:t>
             </a:fld>
             <a:endParaRPr lang="en-US"/>
           </a:p>
@@ -510,7 +518,6 @@
               <a:rPr lang="en-US"/>
               <a:t>Click to edit Master title style</a:t>
             </a:r>
-            <a:endParaRPr lang="en-US"/>
           </a:p>
         </p:txBody>
       </p:sp>
@@ -567,7 +574,6 @@
               <a:rPr lang="en-US"/>
               <a:t>Fifth level</a:t>
             </a:r>
-            <a:endParaRPr lang="en-US"/>
           </a:p>
         </p:txBody>
       </p:sp>
@@ -588,7 +594,7 @@
           <a:p>
             <a:fld id="{828A52BA-EE88-42EE-9D24-82249EAB6ED1}" type="datetimeFigureOut">
               <a:rPr lang="en-US" smtClean="0"/>
-              <a:t>2/17/2017</a:t>
+              <a:t>2/18/2017</a:t>
             </a:fld>
             <a:endParaRPr lang="en-US"/>
           </a:p>
@@ -685,7 +691,6 @@
               <a:rPr lang="en-US"/>
               <a:t>Click to edit Master title style</a:t>
             </a:r>
-            <a:endParaRPr lang="en-US"/>
           </a:p>
         </p:txBody>
       </p:sp>
@@ -737,7 +742,6 @@
               <a:rPr lang="en-US"/>
               <a:t>Fifth level</a:t>
             </a:r>
-            <a:endParaRPr lang="en-US"/>
           </a:p>
         </p:txBody>
       </p:sp>
@@ -758,7 +762,7 @@
           <a:p>
             <a:fld id="{828A52BA-EE88-42EE-9D24-82249EAB6ED1}" type="datetimeFigureOut">
               <a:rPr lang="en-US" smtClean="0"/>
-              <a:t>2/17/2017</a:t>
+              <a:t>2/18/2017</a:t>
             </a:fld>
             <a:endParaRPr lang="en-US"/>
           </a:p>
@@ -864,7 +868,6 @@
               <a:rPr lang="en-US"/>
               <a:t>Click to edit Master title style</a:t>
             </a:r>
-            <a:endParaRPr lang="en-US"/>
           </a:p>
         </p:txBody>
       </p:sp>
@@ -1004,7 +1007,7 @@
           <a:p>
             <a:fld id="{828A52BA-EE88-42EE-9D24-82249EAB6ED1}" type="datetimeFigureOut">
               <a:rPr lang="en-US" smtClean="0"/>
-              <a:t>2/17/2017</a:t>
+              <a:t>2/18/2017</a:t>
             </a:fld>
             <a:endParaRPr lang="en-US"/>
           </a:p>
@@ -1101,7 +1104,6 @@
               <a:rPr lang="en-US"/>
               <a:t>Click to edit Master title style</a:t>
             </a:r>
-            <a:endParaRPr lang="en-US"/>
           </a:p>
         </p:txBody>
       </p:sp>
@@ -1158,7 +1160,6 @@
               <a:rPr lang="en-US"/>
               <a:t>Fifth level</a:t>
             </a:r>
-            <a:endParaRPr lang="en-US"/>
           </a:p>
         </p:txBody>
       </p:sp>
@@ -1215,7 +1216,6 @@
               <a:rPr lang="en-US"/>
               <a:t>Fifth level</a:t>
             </a:r>
-            <a:endParaRPr lang="en-US"/>
           </a:p>
         </p:txBody>
       </p:sp>
@@ -1236,7 +1236,7 @@
           <a:p>
             <a:fld id="{828A52BA-EE88-42EE-9D24-82249EAB6ED1}" type="datetimeFigureOut">
               <a:rPr lang="en-US" smtClean="0"/>
-              <a:t>2/17/2017</a:t>
+              <a:t>2/18/2017</a:t>
             </a:fld>
             <a:endParaRPr lang="en-US"/>
           </a:p>
@@ -1338,7 +1338,6 @@
               <a:rPr lang="en-US"/>
               <a:t>Click to edit Master title style</a:t>
             </a:r>
-            <a:endParaRPr lang="en-US"/>
           </a:p>
         </p:txBody>
       </p:sp>
@@ -1460,7 +1459,6 @@
               <a:rPr lang="en-US"/>
               <a:t>Fifth level</a:t>
             </a:r>
-            <a:endParaRPr lang="en-US"/>
           </a:p>
         </p:txBody>
       </p:sp>
@@ -1582,7 +1580,6 @@
               <a:rPr lang="en-US"/>
               <a:t>Fifth level</a:t>
             </a:r>
-            <a:endParaRPr lang="en-US"/>
           </a:p>
         </p:txBody>
       </p:sp>
@@ -1603,7 +1600,7 @@
           <a:p>
             <a:fld id="{828A52BA-EE88-42EE-9D24-82249EAB6ED1}" type="datetimeFigureOut">
               <a:rPr lang="en-US" smtClean="0"/>
-              <a:t>2/17/2017</a:t>
+              <a:t>2/18/2017</a:t>
             </a:fld>
             <a:endParaRPr lang="en-US"/>
           </a:p>
@@ -1700,7 +1697,6 @@
               <a:rPr lang="en-US"/>
               <a:t>Click to edit Master title style</a:t>
             </a:r>
-            <a:endParaRPr lang="en-US"/>
           </a:p>
         </p:txBody>
       </p:sp>
@@ -1721,7 +1717,7 @@
           <a:p>
             <a:fld id="{828A52BA-EE88-42EE-9D24-82249EAB6ED1}" type="datetimeFigureOut">
               <a:rPr lang="en-US" smtClean="0"/>
-              <a:t>2/17/2017</a:t>
+              <a:t>2/18/2017</a:t>
             </a:fld>
             <a:endParaRPr lang="en-US"/>
           </a:p>
@@ -1816,7 +1812,7 @@
           <a:p>
             <a:fld id="{828A52BA-EE88-42EE-9D24-82249EAB6ED1}" type="datetimeFigureOut">
               <a:rPr lang="en-US" smtClean="0"/>
-              <a:t>2/17/2017</a:t>
+              <a:t>2/18/2017</a:t>
             </a:fld>
             <a:endParaRPr lang="en-US"/>
           </a:p>
@@ -1922,7 +1918,6 @@
               <a:rPr lang="en-US"/>
               <a:t>Click to edit Master title style</a:t>
             </a:r>
-            <a:endParaRPr lang="en-US"/>
           </a:p>
         </p:txBody>
       </p:sp>
@@ -2007,7 +2002,6 @@
               <a:rPr lang="en-US"/>
               <a:t>Fifth level</a:t>
             </a:r>
-            <a:endParaRPr lang="en-US"/>
           </a:p>
         </p:txBody>
       </p:sp>
@@ -2093,7 +2087,7 @@
           <a:p>
             <a:fld id="{828A52BA-EE88-42EE-9D24-82249EAB6ED1}" type="datetimeFigureOut">
               <a:rPr lang="en-US" smtClean="0"/>
-              <a:t>2/17/2017</a:t>
+              <a:t>2/18/2017</a:t>
             </a:fld>
             <a:endParaRPr lang="en-US"/>
           </a:p>
@@ -2199,7 +2193,6 @@
               <a:rPr lang="en-US"/>
               <a:t>Click to edit Master title style</a:t>
             </a:r>
-            <a:endParaRPr lang="en-US"/>
           </a:p>
         </p:txBody>
       </p:sp>
@@ -2346,7 +2339,7 @@
           <a:p>
             <a:fld id="{828A52BA-EE88-42EE-9D24-82249EAB6ED1}" type="datetimeFigureOut">
               <a:rPr lang="en-US" smtClean="0"/>
-              <a:t>2/17/2017</a:t>
+              <a:t>2/18/2017</a:t>
             </a:fld>
             <a:endParaRPr lang="en-US"/>
           </a:p>
@@ -2458,7 +2451,6 @@
               <a:rPr lang="en-US"/>
               <a:t>Click to edit Master title style</a:t>
             </a:r>
-            <a:endParaRPr lang="en-US"/>
           </a:p>
         </p:txBody>
       </p:sp>
@@ -2520,7 +2512,6 @@
               <a:rPr lang="en-US"/>
               <a:t>Fifth level</a:t>
             </a:r>
-            <a:endParaRPr lang="en-US"/>
           </a:p>
         </p:txBody>
       </p:sp>
@@ -2559,7 +2550,7 @@
           <a:p>
             <a:fld id="{828A52BA-EE88-42EE-9D24-82249EAB6ED1}" type="datetimeFigureOut">
               <a:rPr lang="en-US" smtClean="0"/>
-              <a:t>2/17/2017</a:t>
+              <a:t>2/18/2017</a:t>
             </a:fld>
             <a:endParaRPr lang="en-US"/>
           </a:p>
@@ -3009,7 +3000,6 @@
               <a:rPr lang="en-US"/>
               <a:t>Gregory Brunner</a:t>
             </a:r>
-            <a:endParaRPr lang="en-US"/>
           </a:p>
         </p:txBody>
       </p:sp>
@@ -3017,6 +3007,787 @@
     <p:extLst>
       <p:ext uri="{BB962C8B-B14F-4D97-AF65-F5344CB8AC3E}">
         <p14:creationId xmlns:p14="http://schemas.microsoft.com/office/powerpoint/2010/main" val="3074883329"/>
+      </p:ext>
+    </p:extLst>
+  </p:cSld>
+  <p:clrMapOvr>
+    <a:masterClrMapping/>
+  </p:clrMapOvr>
+</p:sld>
+</file>
+
+<file path=ppt/slides/slide2.xml><?xml version="1.0" encoding="utf-8"?>
+<p:sld xmlns:a="http://schemas.openxmlformats.org/drawingml/2006/main" xmlns:r="http://schemas.openxmlformats.org/officeDocument/2006/relationships" xmlns:p="http://schemas.openxmlformats.org/presentationml/2006/main">
+  <p:cSld>
+    <p:spTree>
+      <p:nvGrpSpPr>
+        <p:cNvPr id="1" name=""/>
+        <p:cNvGrpSpPr/>
+        <p:nvPr/>
+      </p:nvGrpSpPr>
+      <p:grpSpPr>
+        <a:xfrm>
+          <a:off x="0" y="0"/>
+          <a:ext cx="0" cy="0"/>
+          <a:chOff x="0" y="0"/>
+          <a:chExt cx="0" cy="0"/>
+        </a:xfrm>
+      </p:grpSpPr>
+      <p:sp>
+        <p:nvSpPr>
+          <p:cNvPr id="2" name="Title 1"/>
+          <p:cNvSpPr>
+            <a:spLocks noGrp="1"/>
+          </p:cNvSpPr>
+          <p:nvPr>
+            <p:ph type="title"/>
+          </p:nvPr>
+        </p:nvSpPr>
+        <p:spPr/>
+        <p:txBody>
+          <a:bodyPr/>
+          <a:lstStyle/>
+          <a:p>
+            <a:r>
+              <a:rPr lang="en-US" dirty="0"/>
+              <a:t>Cursors</a:t>
+            </a:r>
+          </a:p>
+        </p:txBody>
+      </p:sp>
+      <p:sp>
+        <p:nvSpPr>
+          <p:cNvPr id="3" name="Content Placeholder 2"/>
+          <p:cNvSpPr>
+            <a:spLocks noGrp="1"/>
+          </p:cNvSpPr>
+          <p:nvPr>
+            <p:ph idx="1"/>
+          </p:nvPr>
+        </p:nvSpPr>
+        <p:spPr/>
+        <p:txBody>
+          <a:bodyPr/>
+          <a:lstStyle/>
+          <a:p>
+            <a:r>
+              <a:rPr lang="en-US" dirty="0"/>
+              <a:t>Provide row-by-row access to feature data</a:t>
+            </a:r>
+          </a:p>
+          <a:p>
+            <a:endParaRPr lang="en-US" dirty="0"/>
+          </a:p>
+          <a:p>
+            <a:r>
+              <a:rPr lang="en-US" dirty="0"/>
+              <a:t>3 Types</a:t>
+            </a:r>
+          </a:p>
+          <a:p>
+            <a:pPr lvl="1"/>
+            <a:r>
+              <a:rPr lang="en-US" dirty="0"/>
+              <a:t>Search Cursor – Read only access to rows </a:t>
+            </a:r>
+          </a:p>
+          <a:p>
+            <a:pPr lvl="1"/>
+            <a:r>
+              <a:rPr lang="en-US" dirty="0"/>
+              <a:t>Update Cursor – Update and delete rows</a:t>
+            </a:r>
+          </a:p>
+          <a:p>
+            <a:pPr lvl="1"/>
+            <a:r>
+              <a:rPr lang="en-US" dirty="0"/>
+              <a:t>Insert Cursor – Insert new rows into a feature class</a:t>
+            </a:r>
+          </a:p>
+          <a:p>
+            <a:endParaRPr lang="en-US" dirty="0"/>
+          </a:p>
+          <a:p>
+            <a:r>
+              <a:rPr lang="en-US" dirty="0"/>
+              <a:t>Used through the </a:t>
+            </a:r>
+            <a:r>
+              <a:rPr lang="en-US" dirty="0" err="1"/>
+              <a:t>arcpy</a:t>
+            </a:r>
+            <a:r>
+              <a:rPr lang="en-US" dirty="0"/>
+              <a:t> data access module (</a:t>
+            </a:r>
+            <a:r>
+              <a:rPr lang="en-US" dirty="0" err="1"/>
+              <a:t>arcpy.da</a:t>
+            </a:r>
+            <a:r>
+              <a:rPr lang="en-US" dirty="0"/>
+              <a:t>)</a:t>
+            </a:r>
+          </a:p>
+        </p:txBody>
+      </p:sp>
+    </p:spTree>
+    <p:extLst>
+      <p:ext uri="{BB962C8B-B14F-4D97-AF65-F5344CB8AC3E}">
+        <p14:creationId xmlns:p14="http://schemas.microsoft.com/office/powerpoint/2010/main" val="3798799304"/>
+      </p:ext>
+    </p:extLst>
+  </p:cSld>
+  <p:clrMapOvr>
+    <a:masterClrMapping/>
+  </p:clrMapOvr>
+</p:sld>
+</file>
+
+<file path=ppt/slides/slide3.xml><?xml version="1.0" encoding="utf-8"?>
+<p:sld xmlns:a="http://schemas.openxmlformats.org/drawingml/2006/main" xmlns:r="http://schemas.openxmlformats.org/officeDocument/2006/relationships" xmlns:p="http://schemas.openxmlformats.org/presentationml/2006/main">
+  <p:cSld>
+    <p:spTree>
+      <p:nvGrpSpPr>
+        <p:cNvPr id="1" name=""/>
+        <p:cNvGrpSpPr/>
+        <p:nvPr/>
+      </p:nvGrpSpPr>
+      <p:grpSpPr>
+        <a:xfrm>
+          <a:off x="0" y="0"/>
+          <a:ext cx="0" cy="0"/>
+          <a:chOff x="0" y="0"/>
+          <a:chExt cx="0" cy="0"/>
+        </a:xfrm>
+      </p:grpSpPr>
+      <p:sp>
+        <p:nvSpPr>
+          <p:cNvPr id="2" name="Title 1"/>
+          <p:cNvSpPr>
+            <a:spLocks noGrp="1"/>
+          </p:cNvSpPr>
+          <p:nvPr>
+            <p:ph type="title"/>
+          </p:nvPr>
+        </p:nvSpPr>
+        <p:spPr/>
+        <p:txBody>
+          <a:bodyPr/>
+          <a:lstStyle/>
+          <a:p>
+            <a:r>
+              <a:rPr lang="en-US" dirty="0"/>
+              <a:t>Implementation</a:t>
+            </a:r>
+          </a:p>
+        </p:txBody>
+      </p:sp>
+      <p:sp>
+        <p:nvSpPr>
+          <p:cNvPr id="3" name="Content Placeholder 2"/>
+          <p:cNvSpPr>
+            <a:spLocks noGrp="1"/>
+          </p:cNvSpPr>
+          <p:nvPr>
+            <p:ph idx="1"/>
+          </p:nvPr>
+        </p:nvSpPr>
+        <p:spPr/>
+        <p:txBody>
+          <a:bodyPr/>
+          <a:lstStyle/>
+          <a:p>
+            <a:r>
+              <a:rPr lang="en-US" dirty="0" err="1"/>
+              <a:t>Arcpy.da</a:t>
+            </a:r>
+            <a:r>
+              <a:rPr lang="en-US" dirty="0"/>
+              <a:t> cursors opened using “with” statements</a:t>
+            </a:r>
+          </a:p>
+          <a:p>
+            <a:endParaRPr lang="en-US" dirty="0"/>
+          </a:p>
+          <a:p>
+            <a:r>
+              <a:rPr lang="en-US" dirty="0"/>
+              <a:t>“With” denotes when feature class is opened</a:t>
+            </a:r>
+          </a:p>
+          <a:p>
+            <a:endParaRPr lang="en-US" dirty="0"/>
+          </a:p>
+          <a:p>
+            <a:r>
+              <a:rPr lang="en-US" dirty="0"/>
+              <a:t>Row values accessed by index</a:t>
+            </a:r>
+          </a:p>
+          <a:p>
+            <a:endParaRPr lang="en-US" dirty="0"/>
+          </a:p>
+          <a:p>
+            <a:endParaRPr lang="en-US" dirty="0"/>
+          </a:p>
+        </p:txBody>
+      </p:sp>
+      <p:pic>
+        <p:nvPicPr>
+          <p:cNvPr id="7" name="Picture 6"/>
+          <p:cNvPicPr>
+            <a:picLocks noChangeAspect="1"/>
+          </p:cNvPicPr>
+          <p:nvPr/>
+        </p:nvPicPr>
+        <p:blipFill rotWithShape="1">
+          <a:blip r:embed="rId2"/>
+          <a:srcRect l="3575" t="50444" r="41159" b="36465"/>
+          <a:stretch/>
+        </p:blipFill>
+        <p:spPr>
+          <a:xfrm>
+            <a:off x="1928552" y="4605250"/>
+            <a:ext cx="10106892" cy="1346662"/>
+          </a:xfrm>
+          <a:prstGeom prst="rect">
+            <a:avLst/>
+          </a:prstGeom>
+        </p:spPr>
+      </p:pic>
+    </p:spTree>
+    <p:extLst>
+      <p:ext uri="{BB962C8B-B14F-4D97-AF65-F5344CB8AC3E}">
+        <p14:creationId xmlns:p14="http://schemas.microsoft.com/office/powerpoint/2010/main" val="3823095887"/>
+      </p:ext>
+    </p:extLst>
+  </p:cSld>
+  <p:clrMapOvr>
+    <a:masterClrMapping/>
+  </p:clrMapOvr>
+</p:sld>
+</file>
+
+<file path=ppt/slides/slide4.xml><?xml version="1.0" encoding="utf-8"?>
+<p:sld xmlns:a="http://schemas.openxmlformats.org/drawingml/2006/main" xmlns:r="http://schemas.openxmlformats.org/officeDocument/2006/relationships" xmlns:p="http://schemas.openxmlformats.org/presentationml/2006/main">
+  <p:cSld>
+    <p:spTree>
+      <p:nvGrpSpPr>
+        <p:cNvPr id="1" name=""/>
+        <p:cNvGrpSpPr/>
+        <p:nvPr/>
+      </p:nvGrpSpPr>
+      <p:grpSpPr>
+        <a:xfrm>
+          <a:off x="0" y="0"/>
+          <a:ext cx="0" cy="0"/>
+          <a:chOff x="0" y="0"/>
+          <a:chExt cx="0" cy="0"/>
+        </a:xfrm>
+      </p:grpSpPr>
+      <p:sp>
+        <p:nvSpPr>
+          <p:cNvPr id="2" name="Title 1"/>
+          <p:cNvSpPr>
+            <a:spLocks noGrp="1"/>
+          </p:cNvSpPr>
+          <p:nvPr>
+            <p:ph type="title"/>
+          </p:nvPr>
+        </p:nvSpPr>
+        <p:spPr/>
+        <p:txBody>
+          <a:bodyPr/>
+          <a:lstStyle/>
+          <a:p>
+            <a:r>
+              <a:rPr lang="en-US" dirty="0"/>
+              <a:t>Fields and Tokens</a:t>
+            </a:r>
+          </a:p>
+        </p:txBody>
+      </p:sp>
+      <p:sp>
+        <p:nvSpPr>
+          <p:cNvPr id="3" name="Content Placeholder 2"/>
+          <p:cNvSpPr>
+            <a:spLocks noGrp="1"/>
+          </p:cNvSpPr>
+          <p:nvPr>
+            <p:ph idx="1"/>
+          </p:nvPr>
+        </p:nvSpPr>
+        <p:spPr>
+          <a:xfrm>
+            <a:off x="838201" y="1825625"/>
+            <a:ext cx="5329844" cy="4351338"/>
+          </a:xfrm>
+        </p:spPr>
+        <p:txBody>
+          <a:bodyPr/>
+          <a:lstStyle/>
+          <a:p>
+            <a:r>
+              <a:rPr lang="en-US" dirty="0"/>
+              <a:t>Define only the fields in the Feature class you are interested in</a:t>
+            </a:r>
+          </a:p>
+          <a:p>
+            <a:endParaRPr lang="en-US" dirty="0"/>
+          </a:p>
+          <a:p>
+            <a:r>
+              <a:rPr lang="en-US" dirty="0"/>
+              <a:t>Tokens give easy access to geometries and object ID</a:t>
+            </a:r>
+          </a:p>
+        </p:txBody>
+      </p:sp>
+      <p:pic>
+        <p:nvPicPr>
+          <p:cNvPr id="4" name="Picture 3"/>
+          <p:cNvPicPr>
+            <a:picLocks noChangeAspect="1"/>
+          </p:cNvPicPr>
+          <p:nvPr/>
+        </p:nvPicPr>
+        <p:blipFill rotWithShape="1">
+          <a:blip r:embed="rId2"/>
+          <a:srcRect l="42303" t="42525" r="25697" b="11576"/>
+          <a:stretch/>
+        </p:blipFill>
+        <p:spPr>
+          <a:xfrm>
+            <a:off x="5834237" y="1047404"/>
+            <a:ext cx="6357763" cy="5129559"/>
+          </a:xfrm>
+          <a:prstGeom prst="rect">
+            <a:avLst/>
+          </a:prstGeom>
+        </p:spPr>
+      </p:pic>
+    </p:spTree>
+    <p:extLst>
+      <p:ext uri="{BB962C8B-B14F-4D97-AF65-F5344CB8AC3E}">
+        <p14:creationId xmlns:p14="http://schemas.microsoft.com/office/powerpoint/2010/main" val="2520856611"/>
+      </p:ext>
+    </p:extLst>
+  </p:cSld>
+  <p:clrMapOvr>
+    <a:masterClrMapping/>
+  </p:clrMapOvr>
+</p:sld>
+</file>
+
+<file path=ppt/slides/slide5.xml><?xml version="1.0" encoding="utf-8"?>
+<p:sld xmlns:a="http://schemas.openxmlformats.org/drawingml/2006/main" xmlns:r="http://schemas.openxmlformats.org/officeDocument/2006/relationships" xmlns:p="http://schemas.openxmlformats.org/presentationml/2006/main">
+  <p:cSld>
+    <p:spTree>
+      <p:nvGrpSpPr>
+        <p:cNvPr id="1" name=""/>
+        <p:cNvGrpSpPr/>
+        <p:nvPr/>
+      </p:nvGrpSpPr>
+      <p:grpSpPr>
+        <a:xfrm>
+          <a:off x="0" y="0"/>
+          <a:ext cx="0" cy="0"/>
+          <a:chOff x="0" y="0"/>
+          <a:chExt cx="0" cy="0"/>
+        </a:xfrm>
+      </p:grpSpPr>
+      <p:sp>
+        <p:nvSpPr>
+          <p:cNvPr id="2" name="Title 1"/>
+          <p:cNvSpPr>
+            <a:spLocks noGrp="1"/>
+          </p:cNvSpPr>
+          <p:nvPr>
+            <p:ph type="title"/>
+          </p:nvPr>
+        </p:nvSpPr>
+        <p:spPr/>
+        <p:txBody>
+          <a:bodyPr/>
+          <a:lstStyle/>
+          <a:p>
+            <a:r>
+              <a:rPr lang="en-US" dirty="0"/>
+              <a:t>Search Cursor</a:t>
+            </a:r>
+          </a:p>
+        </p:txBody>
+      </p:sp>
+      <p:sp>
+        <p:nvSpPr>
+          <p:cNvPr id="3" name="Content Placeholder 2"/>
+          <p:cNvSpPr>
+            <a:spLocks noGrp="1"/>
+          </p:cNvSpPr>
+          <p:nvPr>
+            <p:ph idx="1"/>
+          </p:nvPr>
+        </p:nvSpPr>
+        <p:spPr>
+          <a:xfrm>
+            <a:off x="838200" y="5569527"/>
+            <a:ext cx="10515600" cy="607436"/>
+          </a:xfrm>
+        </p:spPr>
+        <p:txBody>
+          <a:bodyPr>
+            <a:normAutofit fontScale="70000" lnSpcReduction="20000"/>
+          </a:bodyPr>
+          <a:lstStyle/>
+          <a:p>
+            <a:r>
+              <a:rPr lang="en-US" dirty="0">
+                <a:hlinkClick r:id="rId2"/>
+              </a:rPr>
+              <a:t>http://desktop.arcgis.com/en/arcmap/10.3/analyze/arcpy-data-access/searchcursor-class.htm</a:t>
+            </a:r>
+            <a:br>
+              <a:rPr lang="en-US" dirty="0"/>
+            </a:br>
+            <a:endParaRPr lang="en-US" dirty="0"/>
+          </a:p>
+        </p:txBody>
+      </p:sp>
+      <p:pic>
+        <p:nvPicPr>
+          <p:cNvPr id="4" name="Picture 3"/>
+          <p:cNvPicPr>
+            <a:picLocks noChangeAspect="1"/>
+          </p:cNvPicPr>
+          <p:nvPr/>
+        </p:nvPicPr>
+        <p:blipFill rotWithShape="1">
+          <a:blip r:embed="rId3"/>
+          <a:srcRect l="30484" t="43010" r="34243" b="29192"/>
+          <a:stretch/>
+        </p:blipFill>
+        <p:spPr>
+          <a:xfrm>
+            <a:off x="2527069" y="1812171"/>
+            <a:ext cx="6450676" cy="2859579"/>
+          </a:xfrm>
+          <a:prstGeom prst="rect">
+            <a:avLst/>
+          </a:prstGeom>
+        </p:spPr>
+      </p:pic>
+    </p:spTree>
+    <p:extLst>
+      <p:ext uri="{BB962C8B-B14F-4D97-AF65-F5344CB8AC3E}">
+        <p14:creationId xmlns:p14="http://schemas.microsoft.com/office/powerpoint/2010/main" val="809555282"/>
+      </p:ext>
+    </p:extLst>
+  </p:cSld>
+  <p:clrMapOvr>
+    <a:masterClrMapping/>
+  </p:clrMapOvr>
+</p:sld>
+</file>
+
+<file path=ppt/slides/slide6.xml><?xml version="1.0" encoding="utf-8"?>
+<p:sld xmlns:a="http://schemas.openxmlformats.org/drawingml/2006/main" xmlns:r="http://schemas.openxmlformats.org/officeDocument/2006/relationships" xmlns:p="http://schemas.openxmlformats.org/presentationml/2006/main">
+  <p:cSld>
+    <p:spTree>
+      <p:nvGrpSpPr>
+        <p:cNvPr id="1" name=""/>
+        <p:cNvGrpSpPr/>
+        <p:nvPr/>
+      </p:nvGrpSpPr>
+      <p:grpSpPr>
+        <a:xfrm>
+          <a:off x="0" y="0"/>
+          <a:ext cx="0" cy="0"/>
+          <a:chOff x="0" y="0"/>
+          <a:chExt cx="0" cy="0"/>
+        </a:xfrm>
+      </p:grpSpPr>
+      <p:sp>
+        <p:nvSpPr>
+          <p:cNvPr id="2" name="Title 1"/>
+          <p:cNvSpPr>
+            <a:spLocks noGrp="1"/>
+          </p:cNvSpPr>
+          <p:nvPr>
+            <p:ph type="title"/>
+          </p:nvPr>
+        </p:nvSpPr>
+        <p:spPr/>
+        <p:txBody>
+          <a:bodyPr/>
+          <a:lstStyle/>
+          <a:p>
+            <a:r>
+              <a:rPr lang="en-US" dirty="0"/>
+              <a:t>Update Cursor</a:t>
+            </a:r>
+          </a:p>
+        </p:txBody>
+      </p:sp>
+      <p:sp>
+        <p:nvSpPr>
+          <p:cNvPr id="5" name="Content Placeholder 4"/>
+          <p:cNvSpPr>
+            <a:spLocks noGrp="1"/>
+          </p:cNvSpPr>
+          <p:nvPr>
+            <p:ph idx="1"/>
+          </p:nvPr>
+        </p:nvSpPr>
+        <p:spPr/>
+        <p:txBody>
+          <a:bodyPr/>
+          <a:lstStyle/>
+          <a:p>
+            <a:endParaRPr lang="en-US"/>
+          </a:p>
+        </p:txBody>
+      </p:sp>
+      <p:sp>
+        <p:nvSpPr>
+          <p:cNvPr id="6" name="Text Placeholder 5"/>
+          <p:cNvSpPr>
+            <a:spLocks noGrp="1"/>
+          </p:cNvSpPr>
+          <p:nvPr>
+            <p:ph type="body" sz="half" idx="2"/>
+          </p:nvPr>
+        </p:nvSpPr>
+        <p:spPr/>
+        <p:txBody>
+          <a:bodyPr/>
+          <a:lstStyle/>
+          <a:p>
+            <a:r>
+              <a:rPr lang="en-US" dirty="0">
+                <a:hlinkClick r:id="rId2"/>
+              </a:rPr>
+              <a:t>http://desktop.arcgis.com/en/arcmap/10.3/analyze/arcpy-data-access/updatecursor-class.htm</a:t>
+            </a:r>
+            <a:br>
+              <a:rPr lang="en-US" dirty="0"/>
+            </a:br>
+            <a:endParaRPr lang="en-US" dirty="0"/>
+          </a:p>
+        </p:txBody>
+      </p:sp>
+      <p:pic>
+        <p:nvPicPr>
+          <p:cNvPr id="4" name="Picture 3"/>
+          <p:cNvPicPr>
+            <a:picLocks noChangeAspect="1"/>
+          </p:cNvPicPr>
+          <p:nvPr/>
+        </p:nvPicPr>
+        <p:blipFill rotWithShape="1">
+          <a:blip r:embed="rId3"/>
+          <a:srcRect l="30303" t="38323" r="32970" b="6404"/>
+          <a:stretch/>
+        </p:blipFill>
+        <p:spPr>
+          <a:xfrm>
+            <a:off x="5086003" y="804069"/>
+            <a:ext cx="6716684" cy="5685905"/>
+          </a:xfrm>
+          <a:prstGeom prst="rect">
+            <a:avLst/>
+          </a:prstGeom>
+        </p:spPr>
+      </p:pic>
+    </p:spTree>
+    <p:extLst>
+      <p:ext uri="{BB962C8B-B14F-4D97-AF65-F5344CB8AC3E}">
+        <p14:creationId xmlns:p14="http://schemas.microsoft.com/office/powerpoint/2010/main" val="1740422653"/>
+      </p:ext>
+    </p:extLst>
+  </p:cSld>
+  <p:clrMapOvr>
+    <a:masterClrMapping/>
+  </p:clrMapOvr>
+</p:sld>
+</file>
+
+<file path=ppt/slides/slide7.xml><?xml version="1.0" encoding="utf-8"?>
+<p:sld xmlns:a="http://schemas.openxmlformats.org/drawingml/2006/main" xmlns:r="http://schemas.openxmlformats.org/officeDocument/2006/relationships" xmlns:p="http://schemas.openxmlformats.org/presentationml/2006/main">
+  <p:cSld>
+    <p:spTree>
+      <p:nvGrpSpPr>
+        <p:cNvPr id="1" name=""/>
+        <p:cNvGrpSpPr/>
+        <p:nvPr/>
+      </p:nvGrpSpPr>
+      <p:grpSpPr>
+        <a:xfrm>
+          <a:off x="0" y="0"/>
+          <a:ext cx="0" cy="0"/>
+          <a:chOff x="0" y="0"/>
+          <a:chExt cx="0" cy="0"/>
+        </a:xfrm>
+      </p:grpSpPr>
+      <p:sp>
+        <p:nvSpPr>
+          <p:cNvPr id="2" name="Title 1"/>
+          <p:cNvSpPr>
+            <a:spLocks noGrp="1"/>
+          </p:cNvSpPr>
+          <p:nvPr>
+            <p:ph type="title"/>
+          </p:nvPr>
+        </p:nvSpPr>
+        <p:spPr/>
+        <p:txBody>
+          <a:bodyPr/>
+          <a:lstStyle/>
+          <a:p>
+            <a:r>
+              <a:rPr lang="en-US" dirty="0"/>
+              <a:t>Insert Cursor</a:t>
+            </a:r>
+          </a:p>
+        </p:txBody>
+      </p:sp>
+      <p:sp>
+        <p:nvSpPr>
+          <p:cNvPr id="3" name="Content Placeholder 2"/>
+          <p:cNvSpPr>
+            <a:spLocks noGrp="1"/>
+          </p:cNvSpPr>
+          <p:nvPr>
+            <p:ph idx="1"/>
+          </p:nvPr>
+        </p:nvSpPr>
+        <p:spPr>
+          <a:xfrm>
+            <a:off x="838200" y="5918659"/>
+            <a:ext cx="10515600" cy="856818"/>
+          </a:xfrm>
+        </p:spPr>
+        <p:txBody>
+          <a:bodyPr>
+            <a:normAutofit fontScale="77500" lnSpcReduction="20000"/>
+          </a:bodyPr>
+          <a:lstStyle/>
+          <a:p>
+            <a:r>
+              <a:rPr lang="en-US" dirty="0">
+                <a:hlinkClick r:id="rId2"/>
+              </a:rPr>
+              <a:t>http://desktop.arcgis.com/en/arcmap/10.3/analyze/arcpy-data-access/insertcursor-class.htm</a:t>
+            </a:r>
+            <a:br>
+              <a:rPr lang="en-US" dirty="0"/>
+            </a:br>
+            <a:endParaRPr lang="en-US" dirty="0"/>
+          </a:p>
+        </p:txBody>
+      </p:sp>
+      <p:pic>
+        <p:nvPicPr>
+          <p:cNvPr id="4" name="Picture 3"/>
+          <p:cNvPicPr>
+            <a:picLocks noChangeAspect="1"/>
+          </p:cNvPicPr>
+          <p:nvPr/>
+        </p:nvPicPr>
+        <p:blipFill rotWithShape="1">
+          <a:blip r:embed="rId3"/>
+          <a:srcRect l="30030" t="50768" r="29515" b="11738"/>
+          <a:stretch/>
+        </p:blipFill>
+        <p:spPr>
+          <a:xfrm>
+            <a:off x="2543694" y="1690688"/>
+            <a:ext cx="7398327" cy="3857106"/>
+          </a:xfrm>
+          <a:prstGeom prst="rect">
+            <a:avLst/>
+          </a:prstGeom>
+        </p:spPr>
+      </p:pic>
+    </p:spTree>
+    <p:extLst>
+      <p:ext uri="{BB962C8B-B14F-4D97-AF65-F5344CB8AC3E}">
+        <p14:creationId xmlns:p14="http://schemas.microsoft.com/office/powerpoint/2010/main" val="3941291456"/>
+      </p:ext>
+    </p:extLst>
+  </p:cSld>
+  <p:clrMapOvr>
+    <a:masterClrMapping/>
+  </p:clrMapOvr>
+</p:sld>
+</file>
+
+<file path=ppt/slides/slide8.xml><?xml version="1.0" encoding="utf-8"?>
+<p:sld xmlns:a="http://schemas.openxmlformats.org/drawingml/2006/main" xmlns:r="http://schemas.openxmlformats.org/officeDocument/2006/relationships" xmlns:p="http://schemas.openxmlformats.org/presentationml/2006/main">
+  <p:cSld>
+    <p:spTree>
+      <p:nvGrpSpPr>
+        <p:cNvPr id="1" name=""/>
+        <p:cNvGrpSpPr/>
+        <p:nvPr/>
+      </p:nvGrpSpPr>
+      <p:grpSpPr>
+        <a:xfrm>
+          <a:off x="0" y="0"/>
+          <a:ext cx="0" cy="0"/>
+          <a:chOff x="0" y="0"/>
+          <a:chExt cx="0" cy="0"/>
+        </a:xfrm>
+      </p:grpSpPr>
+      <p:sp>
+        <p:nvSpPr>
+          <p:cNvPr id="2" name="Title 1"/>
+          <p:cNvSpPr>
+            <a:spLocks noGrp="1"/>
+          </p:cNvSpPr>
+          <p:nvPr>
+            <p:ph type="title"/>
+          </p:nvPr>
+        </p:nvSpPr>
+        <p:spPr/>
+        <p:txBody>
+          <a:bodyPr/>
+          <a:lstStyle/>
+          <a:p>
+            <a:r>
+              <a:rPr lang="en-US" dirty="0"/>
+              <a:t>Examples</a:t>
+            </a:r>
+          </a:p>
+        </p:txBody>
+      </p:sp>
+      <p:sp>
+        <p:nvSpPr>
+          <p:cNvPr id="4" name="Text Placeholder 3"/>
+          <p:cNvSpPr>
+            <a:spLocks noGrp="1"/>
+          </p:cNvSpPr>
+          <p:nvPr>
+            <p:ph type="body" idx="1"/>
+          </p:nvPr>
+        </p:nvSpPr>
+        <p:spPr/>
+        <p:txBody>
+          <a:bodyPr/>
+          <a:lstStyle/>
+          <a:p>
+            <a:r>
+              <a:rPr lang="en-US" dirty="0"/>
+              <a:t>Gregory Brunner</a:t>
+            </a:r>
+          </a:p>
+        </p:txBody>
+      </p:sp>
+    </p:spTree>
+    <p:extLst>
+      <p:ext uri="{BB962C8B-B14F-4D97-AF65-F5344CB8AC3E}">
+        <p14:creationId xmlns:p14="http://schemas.microsoft.com/office/powerpoint/2010/main" val="3436889174"/>
       </p:ext>
     </p:extLst>
   </p:cSld>

</xml_diff>